<commit_message>
analiza swot + matrice confuzie documentatie
</commit_message>
<xml_diff>
--- a/Reconstituiri istorice.pptx
+++ b/Reconstituiri istorice.pptx
@@ -13,7 +13,7 @@
     <p:sldId id="267" r:id="rId7"/>
     <p:sldId id="264" r:id="rId8"/>
     <p:sldId id="261" r:id="rId9"/>
-    <p:sldId id="263" r:id="rId10"/>
+    <p:sldId id="268" r:id="rId10"/>
     <p:sldId id="262" r:id="rId11"/>
   </p:sldIdLst>
   <p:sldSz cx="12192000" cy="6858000"/>
@@ -113,6 +113,11 @@
       </a:defRPr>
     </a:lvl9pPr>
   </p:defaultTextStyle>
+  <p:extLst>
+    <p:ext uri="{EFAFB233-063F-42B5-8137-9DF3F51BA10A}">
+      <p15:sldGuideLst xmlns:p15="http://schemas.microsoft.com/office/powerpoint/2012/main"/>
+    </p:ext>
+  </p:extLst>
 </p:presentation>
 </file>
 
@@ -286,7 +291,7 @@
             <a:fld id="{87DE6118-2437-4B30-8E3C-4D2BE6020583}" type="datetimeFigureOut">
               <a:rPr lang="en-US" dirty="0"/>
               <a:pPr/>
-              <a:t>12/6/2021</a:t>
+              <a:t>12/13/2021</a:t>
             </a:fld>
             <a:endParaRPr lang="en-US" dirty="0"/>
           </a:p>
@@ -612,7 +617,7 @@
           <a:p>
             <a:fld id="{87DE6118-2437-4B30-8E3C-4D2BE6020583}" type="datetimeFigureOut">
               <a:rPr lang="en-US" dirty="0"/>
-              <a:t>12/6/2021</a:t>
+              <a:t>12/13/2021</a:t>
             </a:fld>
             <a:endParaRPr lang="en-US" dirty="0"/>
           </a:p>
@@ -787,7 +792,7 @@
           <a:p>
             <a:fld id="{87DE6118-2437-4B30-8E3C-4D2BE6020583}" type="datetimeFigureOut">
               <a:rPr lang="en-US" dirty="0"/>
-              <a:t>12/6/2021</a:t>
+              <a:t>12/13/2021</a:t>
             </a:fld>
             <a:endParaRPr lang="en-US" dirty="0"/>
           </a:p>
@@ -952,7 +957,7 @@
           <a:p>
             <a:fld id="{87DE6118-2437-4B30-8E3C-4D2BE6020583}" type="datetimeFigureOut">
               <a:rPr lang="en-US" dirty="0"/>
-              <a:t>12/6/2021</a:t>
+              <a:t>12/13/2021</a:t>
             </a:fld>
             <a:endParaRPr lang="en-US" dirty="0"/>
           </a:p>
@@ -1225,7 +1230,7 @@
             <a:fld id="{87DE6118-2437-4B30-8E3C-4D2BE6020583}" type="datetimeFigureOut">
               <a:rPr lang="en-US" dirty="0"/>
               <a:pPr/>
-              <a:t>12/6/2021</a:t>
+              <a:t>12/13/2021</a:t>
             </a:fld>
             <a:endParaRPr lang="en-US" dirty="0"/>
           </a:p>
@@ -1615,7 +1620,7 @@
           <a:p>
             <a:fld id="{87DE6118-2437-4B30-8E3C-4D2BE6020583}" type="datetimeFigureOut">
               <a:rPr lang="en-US" dirty="0"/>
-              <a:t>12/6/2021</a:t>
+              <a:t>12/13/2021</a:t>
             </a:fld>
             <a:endParaRPr lang="en-US" dirty="0"/>
           </a:p>
@@ -2087,7 +2092,7 @@
           <a:p>
             <a:fld id="{87DE6118-2437-4B30-8E3C-4D2BE6020583}" type="datetimeFigureOut">
               <a:rPr lang="en-US" dirty="0"/>
-              <a:t>12/6/2021</a:t>
+              <a:t>12/13/2021</a:t>
             </a:fld>
             <a:endParaRPr lang="en-US" dirty="0"/>
           </a:p>
@@ -2200,7 +2205,7 @@
           <a:p>
             <a:fld id="{87DE6118-2437-4B30-8E3C-4D2BE6020583}" type="datetimeFigureOut">
               <a:rPr lang="en-US" dirty="0"/>
-              <a:t>12/6/2021</a:t>
+              <a:t>12/13/2021</a:t>
             </a:fld>
             <a:endParaRPr lang="en-US" dirty="0"/>
           </a:p>
@@ -2290,7 +2295,7 @@
           <a:p>
             <a:fld id="{87DE6118-2437-4B30-8E3C-4D2BE6020583}" type="datetimeFigureOut">
               <a:rPr lang="en-US" dirty="0"/>
-              <a:t>12/6/2021</a:t>
+              <a:t>12/13/2021</a:t>
             </a:fld>
             <a:endParaRPr lang="en-US" dirty="0"/>
           </a:p>
@@ -2632,7 +2637,7 @@
             <a:fld id="{87DE6118-2437-4B30-8E3C-4D2BE6020583}" type="datetimeFigureOut">
               <a:rPr lang="en-US" dirty="0"/>
               <a:pPr/>
-              <a:t>12/6/2021</a:t>
+              <a:t>12/13/2021</a:t>
             </a:fld>
             <a:endParaRPr lang="en-US" dirty="0"/>
           </a:p>
@@ -3017,7 +3022,7 @@
             <a:fld id="{87DE6118-2437-4B30-8E3C-4D2BE6020583}" type="datetimeFigureOut">
               <a:rPr lang="en-US" dirty="0"/>
               <a:pPr/>
-              <a:t>12/6/2021</a:t>
+              <a:t>12/13/2021</a:t>
             </a:fld>
             <a:endParaRPr lang="en-US" dirty="0"/>
           </a:p>
@@ -3292,7 +3297,7 @@
             <a:fld id="{87DE6118-2437-4B30-8E3C-4D2BE6020583}" type="datetimeFigureOut">
               <a:rPr lang="en-US" dirty="0"/>
               <a:pPr/>
-              <a:t>12/6/2021</a:t>
+              <a:t>12/13/2021</a:t>
             </a:fld>
             <a:endParaRPr lang="en-US" dirty="0"/>
           </a:p>
@@ -5915,303 +5920,34 @@
           </a:p>
         </p:txBody>
       </p:sp>
-      <p:sp>
-        <p:nvSpPr>
-          <p:cNvPr id="3" name="Content Placeholder 2"/>
-          <p:cNvSpPr>
-            <a:spLocks noGrp="1"/>
-          </p:cNvSpPr>
-          <p:nvPr>
-            <p:ph idx="1"/>
-          </p:nvPr>
-        </p:nvSpPr>
-        <p:spPr/>
-        <p:txBody>
-          <a:bodyPr/>
-          <a:lstStyle/>
-          <a:p>
-            <a:r>
-              <a:rPr lang="en-US" dirty="0" smtClean="0"/>
-              <a:t>Cu cat </a:t>
-            </a:r>
-            <a:r>
-              <a:rPr lang="en-US" dirty="0" err="1" smtClean="0"/>
-              <a:t>setul</a:t>
-            </a:r>
-            <a:r>
-              <a:rPr lang="en-US" dirty="0" smtClean="0"/>
-              <a:t> de date </a:t>
-            </a:r>
-            <a:r>
-              <a:rPr lang="en-US" dirty="0" err="1" smtClean="0"/>
-              <a:t>isi</a:t>
-            </a:r>
-            <a:r>
-              <a:rPr lang="en-US" dirty="0" smtClean="0"/>
-              <a:t> </a:t>
-            </a:r>
-            <a:r>
-              <a:rPr lang="en-US" dirty="0" err="1" smtClean="0"/>
-              <a:t>mareste</a:t>
-            </a:r>
-            <a:r>
-              <a:rPr lang="en-US" dirty="0" smtClean="0"/>
-              <a:t> </a:t>
-            </a:r>
-            <a:r>
-              <a:rPr lang="en-US" dirty="0" err="1" smtClean="0"/>
-              <a:t>volumul</a:t>
-            </a:r>
-            <a:r>
-              <a:rPr lang="en-US" dirty="0" smtClean="0"/>
-              <a:t>, cu </a:t>
-            </a:r>
-            <a:r>
-              <a:rPr lang="en-US" dirty="0" err="1" smtClean="0"/>
-              <a:t>atat</a:t>
-            </a:r>
-            <a:r>
-              <a:rPr lang="en-US" dirty="0" smtClean="0"/>
-              <a:t> se pot </a:t>
-            </a:r>
-            <a:r>
-              <a:rPr lang="en-US" dirty="0" err="1" smtClean="0"/>
-              <a:t>obtine</a:t>
-            </a:r>
-            <a:r>
-              <a:rPr lang="en-US" dirty="0" smtClean="0"/>
-              <a:t> </a:t>
-            </a:r>
-            <a:r>
-              <a:rPr lang="en-US" dirty="0" err="1" smtClean="0"/>
-              <a:t>rezultate</a:t>
-            </a:r>
-            <a:r>
-              <a:rPr lang="en-US" dirty="0" smtClean="0"/>
-              <a:t> </a:t>
-            </a:r>
-            <a:r>
-              <a:rPr lang="en-US" dirty="0" err="1" smtClean="0"/>
-              <a:t>si</a:t>
-            </a:r>
-            <a:r>
-              <a:rPr lang="en-US" dirty="0" smtClean="0"/>
-              <a:t> </a:t>
-            </a:r>
-            <a:r>
-              <a:rPr lang="en-US" dirty="0" err="1" smtClean="0"/>
-              <a:t>mai</a:t>
-            </a:r>
-            <a:r>
-              <a:rPr lang="en-US" dirty="0" smtClean="0"/>
-              <a:t> </a:t>
-            </a:r>
-            <a:r>
-              <a:rPr lang="en-US" dirty="0" err="1" smtClean="0"/>
-              <a:t>bune</a:t>
-            </a:r>
-            <a:endParaRPr lang="en-US" dirty="0" smtClean="0"/>
-          </a:p>
-          <a:p>
-            <a:pPr marL="0" indent="0">
-              <a:buNone/>
-            </a:pPr>
-            <a:endParaRPr lang="en-US" dirty="0" smtClean="0"/>
-          </a:p>
-          <a:p>
-            <a:r>
-              <a:rPr lang="en-US" dirty="0" smtClean="0"/>
-              <a:t>Important </a:t>
-            </a:r>
-            <a:r>
-              <a:rPr lang="en-US" dirty="0" err="1" smtClean="0"/>
-              <a:t>este</a:t>
-            </a:r>
-            <a:r>
-              <a:rPr lang="en-US" dirty="0" smtClean="0"/>
-              <a:t> ca </a:t>
-            </a:r>
-            <a:r>
-              <a:rPr lang="en-US" dirty="0" err="1" smtClean="0"/>
-              <a:t>setul</a:t>
-            </a:r>
-            <a:r>
-              <a:rPr lang="en-US" dirty="0" smtClean="0"/>
-              <a:t> de date </a:t>
-            </a:r>
-            <a:r>
-              <a:rPr lang="en-US" dirty="0" err="1" smtClean="0"/>
-              <a:t>sa</a:t>
-            </a:r>
-            <a:r>
-              <a:rPr lang="en-US" dirty="0" smtClean="0"/>
-              <a:t> fie </a:t>
-            </a:r>
-            <a:r>
-              <a:rPr lang="en-US" dirty="0" err="1" smtClean="0"/>
-              <a:t>echilibrat</a:t>
-            </a:r>
-            <a:r>
-              <a:rPr lang="en-US" dirty="0" smtClean="0"/>
-              <a:t> in </a:t>
-            </a:r>
-            <a:r>
-              <a:rPr lang="en-US" dirty="0" err="1" smtClean="0"/>
-              <a:t>legatura</a:t>
-            </a:r>
-            <a:r>
-              <a:rPr lang="en-US" dirty="0" smtClean="0"/>
-              <a:t> cu </a:t>
-            </a:r>
-            <a:r>
-              <a:rPr lang="en-US" dirty="0" err="1" smtClean="0"/>
-              <a:t>sexul</a:t>
-            </a:r>
-            <a:r>
-              <a:rPr lang="en-US" dirty="0" smtClean="0"/>
-              <a:t>, </a:t>
-            </a:r>
-            <a:r>
-              <a:rPr lang="en-US" dirty="0" err="1" smtClean="0"/>
-              <a:t>dar</a:t>
-            </a:r>
-            <a:r>
-              <a:rPr lang="en-US" dirty="0" smtClean="0"/>
-              <a:t> </a:t>
-            </a:r>
-            <a:r>
-              <a:rPr lang="en-US" dirty="0" err="1" smtClean="0"/>
-              <a:t>si</a:t>
-            </a:r>
-            <a:r>
-              <a:rPr lang="en-US" dirty="0" smtClean="0"/>
-              <a:t> cu </a:t>
-            </a:r>
-            <a:r>
-              <a:rPr lang="en-US" dirty="0" err="1" smtClean="0"/>
-              <a:t>clasele</a:t>
-            </a:r>
-            <a:r>
-              <a:rPr lang="en-US" dirty="0" smtClean="0"/>
-              <a:t> legate de </a:t>
-            </a:r>
-            <a:r>
-              <a:rPr lang="en-US" dirty="0" err="1" smtClean="0"/>
-              <a:t>varsta</a:t>
-            </a:r>
-            <a:r>
-              <a:rPr lang="en-US" dirty="0" smtClean="0"/>
-              <a:t> </a:t>
-            </a:r>
-            <a:r>
-              <a:rPr lang="en-US" dirty="0" err="1" smtClean="0"/>
-              <a:t>pentru</a:t>
-            </a:r>
-            <a:r>
-              <a:rPr lang="en-US" dirty="0" smtClean="0"/>
-              <a:t> a </a:t>
-            </a:r>
-            <a:r>
-              <a:rPr lang="en-US" dirty="0" err="1" smtClean="0"/>
-              <a:t>obtine</a:t>
-            </a:r>
-            <a:r>
-              <a:rPr lang="en-US" dirty="0" smtClean="0"/>
-              <a:t> </a:t>
-            </a:r>
-            <a:r>
-              <a:rPr lang="en-US" dirty="0" err="1" smtClean="0"/>
-              <a:t>rezultate</a:t>
-            </a:r>
-            <a:r>
-              <a:rPr lang="en-US" dirty="0" smtClean="0"/>
-              <a:t> </a:t>
-            </a:r>
-            <a:r>
-              <a:rPr lang="en-US" dirty="0" err="1" smtClean="0"/>
-              <a:t>mai</a:t>
-            </a:r>
-            <a:r>
-              <a:rPr lang="en-US" dirty="0" smtClean="0"/>
-              <a:t> </a:t>
-            </a:r>
-            <a:r>
-              <a:rPr lang="en-US" dirty="0" err="1" smtClean="0"/>
-              <a:t>bune</a:t>
-            </a:r>
-            <a:endParaRPr lang="en-US" dirty="0" smtClean="0"/>
-          </a:p>
-          <a:p>
-            <a:pPr marL="0" indent="0">
-              <a:buNone/>
-            </a:pPr>
-            <a:endParaRPr lang="en-US" dirty="0" smtClean="0"/>
-          </a:p>
-          <a:p>
-            <a:r>
-              <a:rPr lang="en-US" dirty="0" smtClean="0"/>
-              <a:t>Mai </a:t>
-            </a:r>
-            <a:r>
-              <a:rPr lang="en-US" dirty="0" err="1" smtClean="0"/>
-              <a:t>multe</a:t>
-            </a:r>
-            <a:r>
-              <a:rPr lang="en-US" dirty="0" smtClean="0"/>
-              <a:t> date nu </a:t>
-            </a:r>
-            <a:r>
-              <a:rPr lang="en-US" dirty="0" err="1" smtClean="0"/>
-              <a:t>inseamna</a:t>
-            </a:r>
-            <a:r>
-              <a:rPr lang="en-US" dirty="0" smtClean="0"/>
-              <a:t> </a:t>
-            </a:r>
-            <a:r>
-              <a:rPr lang="en-US" dirty="0" err="1" smtClean="0"/>
-              <a:t>mereu</a:t>
-            </a:r>
-            <a:r>
-              <a:rPr lang="en-US" dirty="0" smtClean="0"/>
-              <a:t> </a:t>
-            </a:r>
-            <a:r>
-              <a:rPr lang="en-US" dirty="0" err="1" smtClean="0"/>
-              <a:t>si</a:t>
-            </a:r>
-            <a:r>
-              <a:rPr lang="en-US" dirty="0" smtClean="0"/>
-              <a:t> </a:t>
-            </a:r>
-            <a:r>
-              <a:rPr lang="en-US" dirty="0" err="1" smtClean="0"/>
-              <a:t>rezultate</a:t>
-            </a:r>
-            <a:r>
-              <a:rPr lang="en-US" dirty="0" smtClean="0"/>
-              <a:t> </a:t>
-            </a:r>
-            <a:r>
-              <a:rPr lang="en-US" dirty="0" err="1" smtClean="0"/>
-              <a:t>mai</a:t>
-            </a:r>
-            <a:r>
-              <a:rPr lang="en-US" dirty="0" smtClean="0"/>
-              <a:t> </a:t>
-            </a:r>
-            <a:r>
-              <a:rPr lang="en-US" dirty="0" err="1" smtClean="0"/>
-              <a:t>bune</a:t>
-            </a:r>
-            <a:endParaRPr lang="en-US" dirty="0"/>
-          </a:p>
-        </p:txBody>
-      </p:sp>
+      <p:pic>
+        <p:nvPicPr>
+          <p:cNvPr id="5" name="Picture 4"/>
+          <p:cNvPicPr>
+            <a:picLocks noChangeAspect="1"/>
+          </p:cNvPicPr>
+          <p:nvPr/>
+        </p:nvPicPr>
+        <p:blipFill>
+          <a:blip r:embed="rId2"/>
+          <a:stretch>
+            <a:fillRect/>
+          </a:stretch>
+        </p:blipFill>
+        <p:spPr>
+          <a:xfrm>
+            <a:off x="2617444" y="1428750"/>
+            <a:ext cx="7896225" cy="5286375"/>
+          </a:xfrm>
+          <a:prstGeom prst="rect">
+            <a:avLst/>
+          </a:prstGeom>
+        </p:spPr>
+      </p:pic>
     </p:spTree>
     <p:extLst>
       <p:ext uri="{BB962C8B-B14F-4D97-AF65-F5344CB8AC3E}">
-        <p14:creationId xmlns:p14="http://schemas.microsoft.com/office/powerpoint/2010/main" val="1856900854"/>
+        <p14:creationId xmlns:p14="http://schemas.microsoft.com/office/powerpoint/2010/main" val="757424239"/>
       </p:ext>
     </p:extLst>
   </p:cSld>

</xml_diff>